<commit_message>
More structure to challenges.
</commit_message>
<xml_diff>
--- a/figs/discussion_points.pptx
+++ b/figs/discussion_points.pptx
@@ -6,6 +6,7 @@
   </p:sldMasterIdLst>
   <p:sldIdLst>
     <p:sldId id="256" r:id="rId2"/>
+    <p:sldId id="257" r:id="rId3"/>
   </p:sldIdLst>
   <p:sldSz cx="12192000" cy="6858000"/>
   <p:notesSz cx="6858000" cy="9144000"/>
@@ -261,7 +262,7 @@
           <a:p>
             <a:fld id="{66BB895C-E5E2-8742-96B2-8A497FA5D297}" type="datetimeFigureOut">
               <a:rPr lang="en-US" smtClean="0"/>
-              <a:t>6/15/20</a:t>
+              <a:t>6/17/20</a:t>
             </a:fld>
             <a:endParaRPr lang="en-US"/>
           </a:p>
@@ -461,7 +462,7 @@
           <a:p>
             <a:fld id="{66BB895C-E5E2-8742-96B2-8A497FA5D297}" type="datetimeFigureOut">
               <a:rPr lang="en-US" smtClean="0"/>
-              <a:t>6/15/20</a:t>
+              <a:t>6/17/20</a:t>
             </a:fld>
             <a:endParaRPr lang="en-US"/>
           </a:p>
@@ -671,7 +672,7 @@
           <a:p>
             <a:fld id="{66BB895C-E5E2-8742-96B2-8A497FA5D297}" type="datetimeFigureOut">
               <a:rPr lang="en-US" smtClean="0"/>
-              <a:t>6/15/20</a:t>
+              <a:t>6/17/20</a:t>
             </a:fld>
             <a:endParaRPr lang="en-US"/>
           </a:p>
@@ -871,7 +872,7 @@
           <a:p>
             <a:fld id="{66BB895C-E5E2-8742-96B2-8A497FA5D297}" type="datetimeFigureOut">
               <a:rPr lang="en-US" smtClean="0"/>
-              <a:t>6/15/20</a:t>
+              <a:t>6/17/20</a:t>
             </a:fld>
             <a:endParaRPr lang="en-US"/>
           </a:p>
@@ -1147,7 +1148,7 @@
           <a:p>
             <a:fld id="{66BB895C-E5E2-8742-96B2-8A497FA5D297}" type="datetimeFigureOut">
               <a:rPr lang="en-US" smtClean="0"/>
-              <a:t>6/15/20</a:t>
+              <a:t>6/17/20</a:t>
             </a:fld>
             <a:endParaRPr lang="en-US"/>
           </a:p>
@@ -1415,7 +1416,7 @@
           <a:p>
             <a:fld id="{66BB895C-E5E2-8742-96B2-8A497FA5D297}" type="datetimeFigureOut">
               <a:rPr lang="en-US" smtClean="0"/>
-              <a:t>6/15/20</a:t>
+              <a:t>6/17/20</a:t>
             </a:fld>
             <a:endParaRPr lang="en-US"/>
           </a:p>
@@ -1830,7 +1831,7 @@
           <a:p>
             <a:fld id="{66BB895C-E5E2-8742-96B2-8A497FA5D297}" type="datetimeFigureOut">
               <a:rPr lang="en-US" smtClean="0"/>
-              <a:t>6/15/20</a:t>
+              <a:t>6/17/20</a:t>
             </a:fld>
             <a:endParaRPr lang="en-US"/>
           </a:p>
@@ -1972,7 +1973,7 @@
           <a:p>
             <a:fld id="{66BB895C-E5E2-8742-96B2-8A497FA5D297}" type="datetimeFigureOut">
               <a:rPr lang="en-US" smtClean="0"/>
-              <a:t>6/15/20</a:t>
+              <a:t>6/17/20</a:t>
             </a:fld>
             <a:endParaRPr lang="en-US"/>
           </a:p>
@@ -2085,7 +2086,7 @@
           <a:p>
             <a:fld id="{66BB895C-E5E2-8742-96B2-8A497FA5D297}" type="datetimeFigureOut">
               <a:rPr lang="en-US" smtClean="0"/>
-              <a:t>6/15/20</a:t>
+              <a:t>6/17/20</a:t>
             </a:fld>
             <a:endParaRPr lang="en-US"/>
           </a:p>
@@ -2398,7 +2399,7 @@
           <a:p>
             <a:fld id="{66BB895C-E5E2-8742-96B2-8A497FA5D297}" type="datetimeFigureOut">
               <a:rPr lang="en-US" smtClean="0"/>
-              <a:t>6/15/20</a:t>
+              <a:t>6/17/20</a:t>
             </a:fld>
             <a:endParaRPr lang="en-US"/>
           </a:p>
@@ -2687,7 +2688,7 @@
           <a:p>
             <a:fld id="{66BB895C-E5E2-8742-96B2-8A497FA5D297}" type="datetimeFigureOut">
               <a:rPr lang="en-US" smtClean="0"/>
-              <a:t>6/15/20</a:t>
+              <a:t>6/17/20</a:t>
             </a:fld>
             <a:endParaRPr lang="en-US"/>
           </a:p>
@@ -2930,7 +2931,7 @@
           <a:p>
             <a:fld id="{66BB895C-E5E2-8742-96B2-8A497FA5D297}" type="datetimeFigureOut">
               <a:rPr lang="en-US" smtClean="0"/>
-              <a:t>6/15/20</a:t>
+              <a:t>6/17/20</a:t>
             </a:fld>
             <a:endParaRPr lang="en-US"/>
           </a:p>
@@ -3668,6 +3669,1197 @@
 </p:sld>
 </file>
 
+<file path=ppt/slides/slide2.xml><?xml version="1.0" encoding="utf-8"?>
+<p:sld xmlns:a="http://schemas.openxmlformats.org/drawingml/2006/main" xmlns:r="http://schemas.openxmlformats.org/officeDocument/2006/relationships" xmlns:p="http://schemas.openxmlformats.org/presentationml/2006/main">
+  <p:cSld>
+    <p:spTree>
+      <p:nvGrpSpPr>
+        <p:cNvPr id="1" name=""/>
+        <p:cNvGrpSpPr/>
+        <p:nvPr/>
+      </p:nvGrpSpPr>
+      <p:grpSpPr>
+        <a:xfrm>
+          <a:off x="0" y="0"/>
+          <a:ext cx="0" cy="0"/>
+          <a:chOff x="0" y="0"/>
+          <a:chExt cx="0" cy="0"/>
+        </a:xfrm>
+      </p:grpSpPr>
+      <p:sp>
+        <p:nvSpPr>
+          <p:cNvPr id="23" name="Oval 22">
+            <a:extLst>
+              <a:ext uri="{FF2B5EF4-FFF2-40B4-BE49-F238E27FC236}">
+                <a16:creationId xmlns:a16="http://schemas.microsoft.com/office/drawing/2014/main" id="{F119F860-0C32-F447-9567-4F845AD94872}"/>
+              </a:ext>
+            </a:extLst>
+          </p:cNvPr>
+          <p:cNvSpPr/>
+          <p:nvPr/>
+        </p:nvSpPr>
+        <p:spPr>
+          <a:xfrm>
+            <a:off x="960895" y="1515654"/>
+            <a:ext cx="6812732" cy="3143895"/>
+          </a:xfrm>
+          <a:prstGeom prst="ellipse">
+            <a:avLst/>
+          </a:prstGeom>
+        </p:spPr>
+        <p:style>
+          <a:lnRef idx="2">
+            <a:schemeClr val="dk1"/>
+          </a:lnRef>
+          <a:fillRef idx="1">
+            <a:schemeClr val="lt1"/>
+          </a:fillRef>
+          <a:effectRef idx="0">
+            <a:schemeClr val="dk1"/>
+          </a:effectRef>
+          <a:fontRef idx="minor">
+            <a:schemeClr val="dk1"/>
+          </a:fontRef>
+        </p:style>
+        <p:txBody>
+          <a:bodyPr rtlCol="0" anchor="ctr"/>
+          <a:lstStyle/>
+          <a:p>
+            <a:pPr algn="ctr"/>
+            <a:endParaRPr lang="en-US"/>
+          </a:p>
+        </p:txBody>
+      </p:sp>
+      <p:sp>
+        <p:nvSpPr>
+          <p:cNvPr id="2" name="Rounded Rectangle 1">
+            <a:extLst>
+              <a:ext uri="{FF2B5EF4-FFF2-40B4-BE49-F238E27FC236}">
+                <a16:creationId xmlns:a16="http://schemas.microsoft.com/office/drawing/2014/main" id="{DFDAAE50-CA47-3C45-97B0-BA0EBDD6962A}"/>
+              </a:ext>
+            </a:extLst>
+          </p:cNvPr>
+          <p:cNvSpPr/>
+          <p:nvPr/>
+        </p:nvSpPr>
+        <p:spPr>
+          <a:xfrm>
+            <a:off x="960895" y="1906291"/>
+            <a:ext cx="2991173" cy="2386739"/>
+          </a:xfrm>
+          <a:prstGeom prst="roundRect">
+            <a:avLst/>
+          </a:prstGeom>
+        </p:spPr>
+        <p:style>
+          <a:lnRef idx="2">
+            <a:schemeClr val="dk1"/>
+          </a:lnRef>
+          <a:fillRef idx="1">
+            <a:schemeClr val="lt1"/>
+          </a:fillRef>
+          <a:effectRef idx="0">
+            <a:schemeClr val="dk1"/>
+          </a:effectRef>
+          <a:fontRef idx="minor">
+            <a:schemeClr val="dk1"/>
+          </a:fontRef>
+        </p:style>
+        <p:txBody>
+          <a:bodyPr rtlCol="0" anchor="ctr"/>
+          <a:lstStyle/>
+          <a:p>
+            <a:pPr algn="ctr"/>
+            <a:endParaRPr lang="en-US" dirty="0">
+              <a:latin typeface="CMU Serif Roman" panose="02000603000000000000" pitchFamily="2" charset="0"/>
+              <a:ea typeface="CMU Serif Roman" panose="02000603000000000000" pitchFamily="2" charset="0"/>
+              <a:cs typeface="CMU Serif Roman" panose="02000603000000000000" pitchFamily="2" charset="0"/>
+            </a:endParaRPr>
+          </a:p>
+        </p:txBody>
+      </p:sp>
+      <p:sp>
+        <p:nvSpPr>
+          <p:cNvPr id="3" name="Rounded Rectangle 2">
+            <a:extLst>
+              <a:ext uri="{FF2B5EF4-FFF2-40B4-BE49-F238E27FC236}">
+                <a16:creationId xmlns:a16="http://schemas.microsoft.com/office/drawing/2014/main" id="{52797164-6EEC-9942-BA48-6F91E30C8CE5}"/>
+              </a:ext>
+            </a:extLst>
+          </p:cNvPr>
+          <p:cNvSpPr/>
+          <p:nvPr/>
+        </p:nvSpPr>
+        <p:spPr>
+          <a:xfrm>
+            <a:off x="4879617" y="1906290"/>
+            <a:ext cx="2991173" cy="2386739"/>
+          </a:xfrm>
+          <a:prstGeom prst="roundRect">
+            <a:avLst/>
+          </a:prstGeom>
+        </p:spPr>
+        <p:style>
+          <a:lnRef idx="2">
+            <a:schemeClr val="dk1"/>
+          </a:lnRef>
+          <a:fillRef idx="1">
+            <a:schemeClr val="lt1"/>
+          </a:fillRef>
+          <a:effectRef idx="0">
+            <a:schemeClr val="dk1"/>
+          </a:effectRef>
+          <a:fontRef idx="minor">
+            <a:schemeClr val="dk1"/>
+          </a:fontRef>
+        </p:style>
+        <p:txBody>
+          <a:bodyPr rtlCol="0" anchor="ctr"/>
+          <a:lstStyle/>
+          <a:p>
+            <a:pPr algn="ctr"/>
+            <a:endParaRPr lang="en-US">
+              <a:latin typeface="CMU Serif Roman" panose="02000603000000000000" pitchFamily="2" charset="0"/>
+              <a:ea typeface="CMU Serif Roman" panose="02000603000000000000" pitchFamily="2" charset="0"/>
+              <a:cs typeface="CMU Serif Roman" panose="02000603000000000000" pitchFamily="2" charset="0"/>
+            </a:endParaRPr>
+          </a:p>
+        </p:txBody>
+      </p:sp>
+      <p:sp>
+        <p:nvSpPr>
+          <p:cNvPr id="21" name="Oval 20">
+            <a:extLst>
+              <a:ext uri="{FF2B5EF4-FFF2-40B4-BE49-F238E27FC236}">
+                <a16:creationId xmlns:a16="http://schemas.microsoft.com/office/drawing/2014/main" id="{62031592-BF6E-9B49-A945-4C1C22E7756F}"/>
+              </a:ext>
+            </a:extLst>
+          </p:cNvPr>
+          <p:cNvSpPr/>
+          <p:nvPr/>
+        </p:nvSpPr>
+        <p:spPr>
+          <a:xfrm>
+            <a:off x="3388858" y="2413416"/>
+            <a:ext cx="3094388" cy="1309968"/>
+          </a:xfrm>
+          <a:prstGeom prst="ellipse">
+            <a:avLst/>
+          </a:prstGeom>
+        </p:spPr>
+        <p:style>
+          <a:lnRef idx="2">
+            <a:schemeClr val="dk1"/>
+          </a:lnRef>
+          <a:fillRef idx="1">
+            <a:schemeClr val="lt1"/>
+          </a:fillRef>
+          <a:effectRef idx="0">
+            <a:schemeClr val="dk1"/>
+          </a:effectRef>
+          <a:fontRef idx="minor">
+            <a:schemeClr val="dk1"/>
+          </a:fontRef>
+        </p:style>
+        <p:txBody>
+          <a:bodyPr rtlCol="0" anchor="ctr"/>
+          <a:lstStyle/>
+          <a:p>
+            <a:pPr algn="ctr"/>
+            <a:endParaRPr lang="en-US"/>
+          </a:p>
+        </p:txBody>
+      </p:sp>
+      <p:sp>
+        <p:nvSpPr>
+          <p:cNvPr id="20" name="Oval 19">
+            <a:extLst>
+              <a:ext uri="{FF2B5EF4-FFF2-40B4-BE49-F238E27FC236}">
+                <a16:creationId xmlns:a16="http://schemas.microsoft.com/office/drawing/2014/main" id="{8A77E861-CA5C-CB49-8A67-651F8BB554B6}"/>
+              </a:ext>
+            </a:extLst>
+          </p:cNvPr>
+          <p:cNvSpPr/>
+          <p:nvPr/>
+        </p:nvSpPr>
+        <p:spPr>
+          <a:xfrm>
+            <a:off x="1378016" y="2471524"/>
+            <a:ext cx="2010842" cy="1146747"/>
+          </a:xfrm>
+          <a:prstGeom prst="ellipse">
+            <a:avLst/>
+          </a:prstGeom>
+        </p:spPr>
+        <p:style>
+          <a:lnRef idx="2">
+            <a:schemeClr val="dk1"/>
+          </a:lnRef>
+          <a:fillRef idx="1">
+            <a:schemeClr val="lt1"/>
+          </a:fillRef>
+          <a:effectRef idx="0">
+            <a:schemeClr val="dk1"/>
+          </a:effectRef>
+          <a:fontRef idx="minor">
+            <a:schemeClr val="dk1"/>
+          </a:fontRef>
+        </p:style>
+        <p:txBody>
+          <a:bodyPr rtlCol="0" anchor="ctr"/>
+          <a:lstStyle/>
+          <a:p>
+            <a:pPr algn="ctr"/>
+            <a:endParaRPr lang="en-US"/>
+          </a:p>
+        </p:txBody>
+      </p:sp>
+      <p:sp>
+        <p:nvSpPr>
+          <p:cNvPr id="4" name="Rounded Rectangle 3">
+            <a:extLst>
+              <a:ext uri="{FF2B5EF4-FFF2-40B4-BE49-F238E27FC236}">
+                <a16:creationId xmlns:a16="http://schemas.microsoft.com/office/drawing/2014/main" id="{B40DA5E7-6E47-0344-86A3-5F0FC90C12B0}"/>
+              </a:ext>
+            </a:extLst>
+          </p:cNvPr>
+          <p:cNvSpPr/>
+          <p:nvPr/>
+        </p:nvSpPr>
+        <p:spPr>
+          <a:xfrm>
+            <a:off x="1337897" y="2304334"/>
+            <a:ext cx="1045540" cy="588768"/>
+          </a:xfrm>
+          <a:prstGeom prst="roundRect">
+            <a:avLst/>
+          </a:prstGeom>
+        </p:spPr>
+        <p:style>
+          <a:lnRef idx="2">
+            <a:schemeClr val="dk1"/>
+          </a:lnRef>
+          <a:fillRef idx="1">
+            <a:schemeClr val="lt1"/>
+          </a:fillRef>
+          <a:effectRef idx="0">
+            <a:schemeClr val="dk1"/>
+          </a:effectRef>
+          <a:fontRef idx="minor">
+            <a:schemeClr val="dk1"/>
+          </a:fontRef>
+        </p:style>
+        <p:txBody>
+          <a:bodyPr rtlCol="0" anchor="ctr"/>
+          <a:lstStyle/>
+          <a:p>
+            <a:pPr algn="ctr"/>
+            <a:r>
+              <a:rPr lang="en-US" sz="1200" dirty="0">
+                <a:latin typeface="CMU Serif Roman" panose="02000603000000000000" pitchFamily="2" charset="0"/>
+                <a:ea typeface="CMU Serif Roman" panose="02000603000000000000" pitchFamily="2" charset="0"/>
+                <a:cs typeface="CMU Serif Roman" panose="02000603000000000000" pitchFamily="2" charset="0"/>
+              </a:rPr>
+              <a:t>Formulate a question</a:t>
+            </a:r>
+          </a:p>
+        </p:txBody>
+      </p:sp>
+      <p:sp>
+        <p:nvSpPr>
+          <p:cNvPr id="5" name="Rounded Rectangle 4">
+            <a:extLst>
+              <a:ext uri="{FF2B5EF4-FFF2-40B4-BE49-F238E27FC236}">
+                <a16:creationId xmlns:a16="http://schemas.microsoft.com/office/drawing/2014/main" id="{605E61C9-A776-F342-966F-32F875988E26}"/>
+              </a:ext>
+            </a:extLst>
+          </p:cNvPr>
+          <p:cNvSpPr/>
+          <p:nvPr/>
+        </p:nvSpPr>
+        <p:spPr>
+          <a:xfrm>
+            <a:off x="2734036" y="2840232"/>
+            <a:ext cx="1045540" cy="588768"/>
+          </a:xfrm>
+          <a:prstGeom prst="roundRect">
+            <a:avLst/>
+          </a:prstGeom>
+        </p:spPr>
+        <p:style>
+          <a:lnRef idx="2">
+            <a:schemeClr val="dk1"/>
+          </a:lnRef>
+          <a:fillRef idx="1">
+            <a:schemeClr val="lt1"/>
+          </a:fillRef>
+          <a:effectRef idx="0">
+            <a:schemeClr val="dk1"/>
+          </a:effectRef>
+          <a:fontRef idx="minor">
+            <a:schemeClr val="dk1"/>
+          </a:fontRef>
+        </p:style>
+        <p:txBody>
+          <a:bodyPr rtlCol="0" anchor="ctr"/>
+          <a:lstStyle/>
+          <a:p>
+            <a:pPr algn="ctr"/>
+            <a:r>
+              <a:rPr lang="en-US" sz="1200" dirty="0">
+                <a:latin typeface="CMU Serif Roman" panose="02000603000000000000" pitchFamily="2" charset="0"/>
+                <a:ea typeface="CMU Serif Roman" panose="02000603000000000000" pitchFamily="2" charset="0"/>
+                <a:cs typeface="CMU Serif Roman" panose="02000603000000000000" pitchFamily="2" charset="0"/>
+              </a:rPr>
+              <a:t>Design an experiment</a:t>
+            </a:r>
+          </a:p>
+        </p:txBody>
+      </p:sp>
+      <p:sp>
+        <p:nvSpPr>
+          <p:cNvPr id="6" name="Rounded Rectangle 5">
+            <a:extLst>
+              <a:ext uri="{FF2B5EF4-FFF2-40B4-BE49-F238E27FC236}">
+                <a16:creationId xmlns:a16="http://schemas.microsoft.com/office/drawing/2014/main" id="{9B4A24E6-69A7-C147-8FD7-DCF2FD612E43}"/>
+              </a:ext>
+            </a:extLst>
+          </p:cNvPr>
+          <p:cNvSpPr/>
+          <p:nvPr/>
+        </p:nvSpPr>
+        <p:spPr>
+          <a:xfrm>
+            <a:off x="1513197" y="3429000"/>
+            <a:ext cx="1045540" cy="588768"/>
+          </a:xfrm>
+          <a:prstGeom prst="roundRect">
+            <a:avLst/>
+          </a:prstGeom>
+        </p:spPr>
+        <p:style>
+          <a:lnRef idx="2">
+            <a:schemeClr val="dk1"/>
+          </a:lnRef>
+          <a:fillRef idx="1">
+            <a:schemeClr val="lt1"/>
+          </a:fillRef>
+          <a:effectRef idx="0">
+            <a:schemeClr val="dk1"/>
+          </a:effectRef>
+          <a:fontRef idx="minor">
+            <a:schemeClr val="dk1"/>
+          </a:fontRef>
+        </p:style>
+        <p:txBody>
+          <a:bodyPr rtlCol="0" anchor="ctr"/>
+          <a:lstStyle/>
+          <a:p>
+            <a:pPr algn="ctr"/>
+            <a:r>
+              <a:rPr lang="en-US" sz="1200" dirty="0">
+                <a:latin typeface="CMU Serif Roman" panose="02000603000000000000" pitchFamily="2" charset="0"/>
+                <a:ea typeface="CMU Serif Roman" panose="02000603000000000000" pitchFamily="2" charset="0"/>
+                <a:cs typeface="CMU Serif Roman" panose="02000603000000000000" pitchFamily="2" charset="0"/>
+              </a:rPr>
+              <a:t>Build tools</a:t>
+            </a:r>
+          </a:p>
+          <a:p>
+            <a:pPr algn="ctr"/>
+            <a:r>
+              <a:rPr lang="en-US" sz="1200" dirty="0">
+                <a:latin typeface="CMU Serif Roman" panose="02000603000000000000" pitchFamily="2" charset="0"/>
+                <a:ea typeface="CMU Serif Roman" panose="02000603000000000000" pitchFamily="2" charset="0"/>
+                <a:cs typeface="CMU Serif Roman" panose="02000603000000000000" pitchFamily="2" charset="0"/>
+              </a:rPr>
+              <a:t>(</a:t>
+            </a:r>
+            <a:r>
+              <a:rPr lang="en-US" sz="1200" b="1" dirty="0">
+                <a:latin typeface="CMU Serif Roman" panose="02000603000000000000" pitchFamily="2" charset="0"/>
+                <a:ea typeface="CMU Serif Roman" panose="02000603000000000000" pitchFamily="2" charset="0"/>
+                <a:cs typeface="CMU Serif Roman" panose="02000603000000000000" pitchFamily="2" charset="0"/>
+              </a:rPr>
+              <a:t>C1</a:t>
+            </a:r>
+            <a:r>
+              <a:rPr lang="en-US" sz="1200" dirty="0">
+                <a:latin typeface="CMU Serif Roman" panose="02000603000000000000" pitchFamily="2" charset="0"/>
+                <a:ea typeface="CMU Serif Roman" panose="02000603000000000000" pitchFamily="2" charset="0"/>
+                <a:cs typeface="CMU Serif Roman" panose="02000603000000000000" pitchFamily="2" charset="0"/>
+              </a:rPr>
+              <a:t>-</a:t>
+            </a:r>
+            <a:r>
+              <a:rPr lang="en-US" sz="1200" b="1" dirty="0">
+                <a:latin typeface="CMU Serif Roman" panose="02000603000000000000" pitchFamily="2" charset="0"/>
+                <a:ea typeface="CMU Serif Roman" panose="02000603000000000000" pitchFamily="2" charset="0"/>
+                <a:cs typeface="CMU Serif Roman" panose="02000603000000000000" pitchFamily="2" charset="0"/>
+              </a:rPr>
+              <a:t>C4</a:t>
+            </a:r>
+            <a:r>
+              <a:rPr lang="en-US" sz="1200" dirty="0">
+                <a:latin typeface="CMU Serif Roman" panose="02000603000000000000" pitchFamily="2" charset="0"/>
+                <a:ea typeface="CMU Serif Roman" panose="02000603000000000000" pitchFamily="2" charset="0"/>
+                <a:cs typeface="CMU Serif Roman" panose="02000603000000000000" pitchFamily="2" charset="0"/>
+              </a:rPr>
+              <a:t>)</a:t>
+            </a:r>
+          </a:p>
+        </p:txBody>
+      </p:sp>
+      <p:sp>
+        <p:nvSpPr>
+          <p:cNvPr id="8" name="Rounded Rectangle 7">
+            <a:extLst>
+              <a:ext uri="{FF2B5EF4-FFF2-40B4-BE49-F238E27FC236}">
+                <a16:creationId xmlns:a16="http://schemas.microsoft.com/office/drawing/2014/main" id="{0C2C0827-ACA0-204F-BC45-060A2552A1C1}"/>
+              </a:ext>
+            </a:extLst>
+          </p:cNvPr>
+          <p:cNvSpPr/>
+          <p:nvPr/>
+        </p:nvSpPr>
+        <p:spPr>
+          <a:xfrm>
+            <a:off x="5725209" y="2304334"/>
+            <a:ext cx="1372634" cy="588768"/>
+          </a:xfrm>
+          <a:prstGeom prst="roundRect">
+            <a:avLst/>
+          </a:prstGeom>
+        </p:spPr>
+        <p:style>
+          <a:lnRef idx="2">
+            <a:schemeClr val="dk1"/>
+          </a:lnRef>
+          <a:fillRef idx="1">
+            <a:schemeClr val="lt1"/>
+          </a:fillRef>
+          <a:effectRef idx="0">
+            <a:schemeClr val="dk1"/>
+          </a:effectRef>
+          <a:fontRef idx="minor">
+            <a:schemeClr val="dk1"/>
+          </a:fontRef>
+        </p:style>
+        <p:txBody>
+          <a:bodyPr rtlCol="0" anchor="ctr"/>
+          <a:lstStyle/>
+          <a:p>
+            <a:pPr algn="ctr"/>
+            <a:r>
+              <a:rPr lang="en-US" sz="1200" dirty="0">
+                <a:latin typeface="CMU Serif Roman" panose="02000603000000000000" pitchFamily="2" charset="0"/>
+                <a:ea typeface="CMU Serif Roman" panose="02000603000000000000" pitchFamily="2" charset="0"/>
+                <a:cs typeface="CMU Serif Roman" panose="02000603000000000000" pitchFamily="2" charset="0"/>
+              </a:rPr>
+              <a:t>Run experiment,</a:t>
+            </a:r>
+          </a:p>
+          <a:p>
+            <a:pPr algn="ctr"/>
+            <a:r>
+              <a:rPr lang="en-US" sz="1200" dirty="0">
+                <a:latin typeface="CMU Serif Roman" panose="02000603000000000000" pitchFamily="2" charset="0"/>
+                <a:ea typeface="CMU Serif Roman" panose="02000603000000000000" pitchFamily="2" charset="0"/>
+                <a:cs typeface="CMU Serif Roman" panose="02000603000000000000" pitchFamily="2" charset="0"/>
+              </a:rPr>
+              <a:t>gather data</a:t>
+            </a:r>
+          </a:p>
+          <a:p>
+            <a:pPr algn="ctr"/>
+            <a:r>
+              <a:rPr lang="en-US" sz="1200" dirty="0">
+                <a:latin typeface="CMU Serif Roman" panose="02000603000000000000" pitchFamily="2" charset="0"/>
+                <a:ea typeface="CMU Serif Roman" panose="02000603000000000000" pitchFamily="2" charset="0"/>
+                <a:cs typeface="CMU Serif Roman" panose="02000603000000000000" pitchFamily="2" charset="0"/>
+              </a:rPr>
+              <a:t>(</a:t>
+            </a:r>
+            <a:r>
+              <a:rPr lang="en-US" sz="1200" b="1" dirty="0">
+                <a:latin typeface="CMU Serif Roman" panose="02000603000000000000" pitchFamily="2" charset="0"/>
+                <a:ea typeface="CMU Serif Roman" panose="02000603000000000000" pitchFamily="2" charset="0"/>
+                <a:cs typeface="CMU Serif Roman" panose="02000603000000000000" pitchFamily="2" charset="0"/>
+              </a:rPr>
+              <a:t>C2-C4</a:t>
+            </a:r>
+            <a:r>
+              <a:rPr lang="en-US" sz="1200" dirty="0">
+                <a:latin typeface="CMU Serif Roman" panose="02000603000000000000" pitchFamily="2" charset="0"/>
+                <a:ea typeface="CMU Serif Roman" panose="02000603000000000000" pitchFamily="2" charset="0"/>
+                <a:cs typeface="CMU Serif Roman" panose="02000603000000000000" pitchFamily="2" charset="0"/>
+              </a:rPr>
+              <a:t>)</a:t>
+            </a:r>
+          </a:p>
+        </p:txBody>
+      </p:sp>
+      <p:sp>
+        <p:nvSpPr>
+          <p:cNvPr id="9" name="Rounded Rectangle 8">
+            <a:extLst>
+              <a:ext uri="{FF2B5EF4-FFF2-40B4-BE49-F238E27FC236}">
+                <a16:creationId xmlns:a16="http://schemas.microsoft.com/office/drawing/2014/main" id="{DFCCCA43-1596-694E-B9E1-A76E3D2FF05A}"/>
+              </a:ext>
+            </a:extLst>
+          </p:cNvPr>
+          <p:cNvSpPr/>
+          <p:nvPr/>
+        </p:nvSpPr>
+        <p:spPr>
+          <a:xfrm>
+            <a:off x="5171209" y="3291145"/>
+            <a:ext cx="1372634" cy="588768"/>
+          </a:xfrm>
+          <a:prstGeom prst="roundRect">
+            <a:avLst/>
+          </a:prstGeom>
+        </p:spPr>
+        <p:style>
+          <a:lnRef idx="2">
+            <a:schemeClr val="dk1"/>
+          </a:lnRef>
+          <a:fillRef idx="1">
+            <a:schemeClr val="lt1"/>
+          </a:fillRef>
+          <a:effectRef idx="0">
+            <a:schemeClr val="dk1"/>
+          </a:effectRef>
+          <a:fontRef idx="minor">
+            <a:schemeClr val="dk1"/>
+          </a:fontRef>
+        </p:style>
+        <p:txBody>
+          <a:bodyPr rtlCol="0" anchor="ctr"/>
+          <a:lstStyle/>
+          <a:p>
+            <a:pPr algn="ctr"/>
+            <a:r>
+              <a:rPr lang="en-US" sz="1200" dirty="0">
+                <a:latin typeface="CMU Serif Roman" panose="02000603000000000000" pitchFamily="2" charset="0"/>
+                <a:ea typeface="CMU Serif Roman" panose="02000603000000000000" pitchFamily="2" charset="0"/>
+                <a:cs typeface="CMU Serif Roman" panose="02000603000000000000" pitchFamily="2" charset="0"/>
+              </a:rPr>
+              <a:t>Analyze data</a:t>
+            </a:r>
+          </a:p>
+          <a:p>
+            <a:pPr algn="ctr"/>
+            <a:r>
+              <a:rPr lang="en-US" sz="1200" dirty="0">
+                <a:latin typeface="CMU Serif Roman" panose="02000603000000000000" pitchFamily="2" charset="0"/>
+                <a:ea typeface="CMU Serif Roman" panose="02000603000000000000" pitchFamily="2" charset="0"/>
+                <a:cs typeface="CMU Serif Roman" panose="02000603000000000000" pitchFamily="2" charset="0"/>
+              </a:rPr>
+              <a:t>(</a:t>
+            </a:r>
+            <a:r>
+              <a:rPr lang="en-US" sz="1200" b="1" dirty="0">
+                <a:latin typeface="CMU Serif Roman" panose="02000603000000000000" pitchFamily="2" charset="0"/>
+                <a:ea typeface="CMU Serif Roman" panose="02000603000000000000" pitchFamily="2" charset="0"/>
+                <a:cs typeface="CMU Serif Roman" panose="02000603000000000000" pitchFamily="2" charset="0"/>
+              </a:rPr>
+              <a:t>C2,C4</a:t>
+            </a:r>
+            <a:r>
+              <a:rPr lang="en-US" sz="1200" dirty="0">
+                <a:latin typeface="CMU Serif Roman" panose="02000603000000000000" pitchFamily="2" charset="0"/>
+                <a:ea typeface="CMU Serif Roman" panose="02000603000000000000" pitchFamily="2" charset="0"/>
+                <a:cs typeface="CMU Serif Roman" panose="02000603000000000000" pitchFamily="2" charset="0"/>
+              </a:rPr>
+              <a:t>)</a:t>
+            </a:r>
+          </a:p>
+        </p:txBody>
+      </p:sp>
+      <p:sp>
+        <p:nvSpPr>
+          <p:cNvPr id="10" name="Rounded Rectangle 9">
+            <a:extLst>
+              <a:ext uri="{FF2B5EF4-FFF2-40B4-BE49-F238E27FC236}">
+                <a16:creationId xmlns:a16="http://schemas.microsoft.com/office/drawing/2014/main" id="{4DB0E458-3F39-3148-8E9B-9C93DC47E10B}"/>
+              </a:ext>
+            </a:extLst>
+          </p:cNvPr>
+          <p:cNvSpPr/>
+          <p:nvPr/>
+        </p:nvSpPr>
+        <p:spPr>
+          <a:xfrm>
+            <a:off x="6814495" y="3648370"/>
+            <a:ext cx="959132" cy="316529"/>
+          </a:xfrm>
+          <a:prstGeom prst="roundRect">
+            <a:avLst/>
+          </a:prstGeom>
+        </p:spPr>
+        <p:style>
+          <a:lnRef idx="2">
+            <a:schemeClr val="dk1"/>
+          </a:lnRef>
+          <a:fillRef idx="1">
+            <a:schemeClr val="lt1"/>
+          </a:fillRef>
+          <a:effectRef idx="0">
+            <a:schemeClr val="dk1"/>
+          </a:effectRef>
+          <a:fontRef idx="minor">
+            <a:schemeClr val="dk1"/>
+          </a:fontRef>
+        </p:style>
+        <p:txBody>
+          <a:bodyPr rtlCol="0" anchor="ctr"/>
+          <a:lstStyle/>
+          <a:p>
+            <a:pPr algn="ctr"/>
+            <a:r>
+              <a:rPr lang="en-US" sz="1200" dirty="0">
+                <a:latin typeface="CMU Serif Roman" panose="02000603000000000000" pitchFamily="2" charset="0"/>
+                <a:ea typeface="CMU Serif Roman" panose="02000603000000000000" pitchFamily="2" charset="0"/>
+                <a:cs typeface="CMU Serif Roman" panose="02000603000000000000" pitchFamily="2" charset="0"/>
+              </a:rPr>
+              <a:t>Publish</a:t>
+            </a:r>
+          </a:p>
+        </p:txBody>
+      </p:sp>
+      <p:sp>
+        <p:nvSpPr>
+          <p:cNvPr id="11" name="TextBox 10">
+            <a:extLst>
+              <a:ext uri="{FF2B5EF4-FFF2-40B4-BE49-F238E27FC236}">
+                <a16:creationId xmlns:a16="http://schemas.microsoft.com/office/drawing/2014/main" id="{67290662-44A9-BD4E-89AE-2DEE6B3BBDAA}"/>
+              </a:ext>
+            </a:extLst>
+          </p:cNvPr>
+          <p:cNvSpPr txBox="1"/>
+          <p:nvPr/>
+        </p:nvSpPr>
+        <p:spPr>
+          <a:xfrm>
+            <a:off x="1090874" y="2027335"/>
+            <a:ext cx="494046" cy="276999"/>
+          </a:xfrm>
+          <a:prstGeom prst="rect">
+            <a:avLst/>
+          </a:prstGeom>
+          <a:noFill/>
+        </p:spPr>
+        <p:txBody>
+          <a:bodyPr wrap="none" rtlCol="0">
+            <a:spAutoFit/>
+          </a:bodyPr>
+          <a:lstStyle/>
+          <a:p>
+            <a:r>
+              <a:rPr lang="en-US" sz="1200" b="1" dirty="0">
+                <a:latin typeface="CMU Serif Roman" panose="02000603000000000000" pitchFamily="2" charset="0"/>
+                <a:ea typeface="CMU Serif Roman" panose="02000603000000000000" pitchFamily="2" charset="0"/>
+                <a:cs typeface="CMU Serif Roman" panose="02000603000000000000" pitchFamily="2" charset="0"/>
+              </a:rPr>
+              <a:t>Plan</a:t>
+            </a:r>
+          </a:p>
+        </p:txBody>
+      </p:sp>
+      <p:sp>
+        <p:nvSpPr>
+          <p:cNvPr id="12" name="TextBox 11">
+            <a:extLst>
+              <a:ext uri="{FF2B5EF4-FFF2-40B4-BE49-F238E27FC236}">
+                <a16:creationId xmlns:a16="http://schemas.microsoft.com/office/drawing/2014/main" id="{70C67384-FBC8-B54A-AFFE-E34EE5F2963A}"/>
+              </a:ext>
+            </a:extLst>
+          </p:cNvPr>
+          <p:cNvSpPr txBox="1"/>
+          <p:nvPr/>
+        </p:nvSpPr>
+        <p:spPr>
+          <a:xfrm>
+            <a:off x="7051955" y="2027334"/>
+            <a:ext cx="721672" cy="276999"/>
+          </a:xfrm>
+          <a:prstGeom prst="rect">
+            <a:avLst/>
+          </a:prstGeom>
+          <a:noFill/>
+        </p:spPr>
+        <p:txBody>
+          <a:bodyPr wrap="none" rtlCol="0">
+            <a:spAutoFit/>
+          </a:bodyPr>
+          <a:lstStyle/>
+          <a:p>
+            <a:r>
+              <a:rPr lang="en-US" sz="1200" b="1" dirty="0">
+                <a:latin typeface="CMU Serif Roman" panose="02000603000000000000" pitchFamily="2" charset="0"/>
+                <a:ea typeface="CMU Serif Roman" panose="02000603000000000000" pitchFamily="2" charset="0"/>
+                <a:cs typeface="CMU Serif Roman" panose="02000603000000000000" pitchFamily="2" charset="0"/>
+              </a:rPr>
+              <a:t>Execute</a:t>
+            </a:r>
+          </a:p>
+        </p:txBody>
+      </p:sp>
+      <p:sp>
+        <p:nvSpPr>
+          <p:cNvPr id="24" name="Rounded Rectangle 23">
+            <a:extLst>
+              <a:ext uri="{FF2B5EF4-FFF2-40B4-BE49-F238E27FC236}">
+                <a16:creationId xmlns:a16="http://schemas.microsoft.com/office/drawing/2014/main" id="{852E0C2C-294C-9943-8B37-B217D6166CD1}"/>
+              </a:ext>
+            </a:extLst>
+          </p:cNvPr>
+          <p:cNvSpPr/>
+          <p:nvPr/>
+        </p:nvSpPr>
+        <p:spPr>
+          <a:xfrm>
+            <a:off x="4890087" y="1906290"/>
+            <a:ext cx="2991173" cy="2386739"/>
+          </a:xfrm>
+          <a:prstGeom prst="roundRect">
+            <a:avLst/>
+          </a:prstGeom>
+          <a:noFill/>
+        </p:spPr>
+        <p:style>
+          <a:lnRef idx="2">
+            <a:schemeClr val="dk1"/>
+          </a:lnRef>
+          <a:fillRef idx="1">
+            <a:schemeClr val="lt1"/>
+          </a:fillRef>
+          <a:effectRef idx="0">
+            <a:schemeClr val="dk1"/>
+          </a:effectRef>
+          <a:fontRef idx="minor">
+            <a:schemeClr val="dk1"/>
+          </a:fontRef>
+        </p:style>
+        <p:txBody>
+          <a:bodyPr rtlCol="0" anchor="ctr"/>
+          <a:lstStyle/>
+          <a:p>
+            <a:pPr algn="ctr"/>
+            <a:endParaRPr lang="en-US">
+              <a:latin typeface="CMU Serif Roman" panose="02000603000000000000" pitchFamily="2" charset="0"/>
+              <a:ea typeface="CMU Serif Roman" panose="02000603000000000000" pitchFamily="2" charset="0"/>
+              <a:cs typeface="CMU Serif Roman" panose="02000603000000000000" pitchFamily="2" charset="0"/>
+            </a:endParaRPr>
+          </a:p>
+        </p:txBody>
+      </p:sp>
+      <p:sp>
+        <p:nvSpPr>
+          <p:cNvPr id="22" name="Triangle 21">
+            <a:extLst>
+              <a:ext uri="{FF2B5EF4-FFF2-40B4-BE49-F238E27FC236}">
+                <a16:creationId xmlns:a16="http://schemas.microsoft.com/office/drawing/2014/main" id="{0774D766-6571-0E46-98C5-E5AC975C4CCE}"/>
+              </a:ext>
+            </a:extLst>
+          </p:cNvPr>
+          <p:cNvSpPr/>
+          <p:nvPr/>
+        </p:nvSpPr>
+        <p:spPr>
+          <a:xfrm rot="5400000">
+            <a:off x="4206006" y="1425385"/>
+            <a:ext cx="238708" cy="205783"/>
+          </a:xfrm>
+          <a:prstGeom prst="triangle">
+            <a:avLst/>
+          </a:prstGeom>
+        </p:spPr>
+        <p:style>
+          <a:lnRef idx="2">
+            <a:schemeClr val="dk1">
+              <a:shade val="50000"/>
+            </a:schemeClr>
+          </a:lnRef>
+          <a:fillRef idx="1">
+            <a:schemeClr val="dk1"/>
+          </a:fillRef>
+          <a:effectRef idx="0">
+            <a:schemeClr val="dk1"/>
+          </a:effectRef>
+          <a:fontRef idx="minor">
+            <a:schemeClr val="lt1"/>
+          </a:fontRef>
+        </p:style>
+        <p:txBody>
+          <a:bodyPr rtlCol="0" anchor="ctr"/>
+          <a:lstStyle/>
+          <a:p>
+            <a:pPr algn="ctr"/>
+            <a:endParaRPr lang="en-US"/>
+          </a:p>
+        </p:txBody>
+      </p:sp>
+      <p:sp>
+        <p:nvSpPr>
+          <p:cNvPr id="26" name="Triangle 25">
+            <a:extLst>
+              <a:ext uri="{FF2B5EF4-FFF2-40B4-BE49-F238E27FC236}">
+                <a16:creationId xmlns:a16="http://schemas.microsoft.com/office/drawing/2014/main" id="{92C162CA-4D63-E44C-800D-4960BE8BD6E7}"/>
+              </a:ext>
+            </a:extLst>
+          </p:cNvPr>
+          <p:cNvSpPr/>
+          <p:nvPr/>
+        </p:nvSpPr>
+        <p:spPr>
+          <a:xfrm rot="16200000">
+            <a:off x="4203650" y="4556657"/>
+            <a:ext cx="238708" cy="205783"/>
+          </a:xfrm>
+          <a:prstGeom prst="triangle">
+            <a:avLst/>
+          </a:prstGeom>
+        </p:spPr>
+        <p:style>
+          <a:lnRef idx="2">
+            <a:schemeClr val="dk1">
+              <a:shade val="50000"/>
+            </a:schemeClr>
+          </a:lnRef>
+          <a:fillRef idx="1">
+            <a:schemeClr val="dk1"/>
+          </a:fillRef>
+          <a:effectRef idx="0">
+            <a:schemeClr val="dk1"/>
+          </a:effectRef>
+          <a:fontRef idx="minor">
+            <a:schemeClr val="lt1"/>
+          </a:fontRef>
+        </p:style>
+        <p:txBody>
+          <a:bodyPr rtlCol="0" anchor="ctr"/>
+          <a:lstStyle/>
+          <a:p>
+            <a:pPr algn="ctr"/>
+            <a:endParaRPr lang="en-US"/>
+          </a:p>
+        </p:txBody>
+      </p:sp>
+      <p:sp>
+        <p:nvSpPr>
+          <p:cNvPr id="27" name="Triangle 26">
+            <a:extLst>
+              <a:ext uri="{FF2B5EF4-FFF2-40B4-BE49-F238E27FC236}">
+                <a16:creationId xmlns:a16="http://schemas.microsoft.com/office/drawing/2014/main" id="{076B78D5-24E8-744C-B52D-64B22D38936F}"/>
+              </a:ext>
+            </a:extLst>
+          </p:cNvPr>
+          <p:cNvSpPr/>
+          <p:nvPr/>
+        </p:nvSpPr>
+        <p:spPr>
+          <a:xfrm rot="8870274">
+            <a:off x="1307985" y="3095545"/>
+            <a:ext cx="238708" cy="205783"/>
+          </a:xfrm>
+          <a:prstGeom prst="triangle">
+            <a:avLst/>
+          </a:prstGeom>
+        </p:spPr>
+        <p:style>
+          <a:lnRef idx="2">
+            <a:schemeClr val="dk1">
+              <a:shade val="50000"/>
+            </a:schemeClr>
+          </a:lnRef>
+          <a:fillRef idx="1">
+            <a:schemeClr val="dk1"/>
+          </a:fillRef>
+          <a:effectRef idx="0">
+            <a:schemeClr val="dk1"/>
+          </a:effectRef>
+          <a:fontRef idx="minor">
+            <a:schemeClr val="lt1"/>
+          </a:fontRef>
+        </p:style>
+        <p:txBody>
+          <a:bodyPr rtlCol="0" anchor="ctr"/>
+          <a:lstStyle/>
+          <a:p>
+            <a:pPr algn="ctr"/>
+            <a:endParaRPr lang="en-US"/>
+          </a:p>
+        </p:txBody>
+      </p:sp>
+      <p:sp>
+        <p:nvSpPr>
+          <p:cNvPr id="28" name="Triangle 27">
+            <a:extLst>
+              <a:ext uri="{FF2B5EF4-FFF2-40B4-BE49-F238E27FC236}">
+                <a16:creationId xmlns:a16="http://schemas.microsoft.com/office/drawing/2014/main" id="{83A7506A-1C90-2241-9AF7-BDA89807F903}"/>
+              </a:ext>
+            </a:extLst>
+          </p:cNvPr>
+          <p:cNvSpPr/>
+          <p:nvPr/>
+        </p:nvSpPr>
+        <p:spPr>
+          <a:xfrm rot="5746636">
+            <a:off x="2681204" y="2423882"/>
+            <a:ext cx="238708" cy="205783"/>
+          </a:xfrm>
+          <a:prstGeom prst="triangle">
+            <a:avLst/>
+          </a:prstGeom>
+        </p:spPr>
+        <p:style>
+          <a:lnRef idx="2">
+            <a:schemeClr val="dk1">
+              <a:shade val="50000"/>
+            </a:schemeClr>
+          </a:lnRef>
+          <a:fillRef idx="1">
+            <a:schemeClr val="dk1"/>
+          </a:fillRef>
+          <a:effectRef idx="0">
+            <a:schemeClr val="dk1"/>
+          </a:effectRef>
+          <a:fontRef idx="minor">
+            <a:schemeClr val="lt1"/>
+          </a:fontRef>
+        </p:style>
+        <p:txBody>
+          <a:bodyPr rtlCol="0" anchor="ctr"/>
+          <a:lstStyle/>
+          <a:p>
+            <a:pPr algn="ctr"/>
+            <a:endParaRPr lang="en-US"/>
+          </a:p>
+        </p:txBody>
+      </p:sp>
+      <p:sp>
+        <p:nvSpPr>
+          <p:cNvPr id="30" name="Triangle 29">
+            <a:extLst>
+              <a:ext uri="{FF2B5EF4-FFF2-40B4-BE49-F238E27FC236}">
+                <a16:creationId xmlns:a16="http://schemas.microsoft.com/office/drawing/2014/main" id="{34EF0860-1102-FC42-969B-21C7F82E51E6}"/>
+              </a:ext>
+            </a:extLst>
+          </p:cNvPr>
+          <p:cNvSpPr/>
+          <p:nvPr/>
+        </p:nvSpPr>
+        <p:spPr>
+          <a:xfrm rot="5186380">
+            <a:off x="4389779" y="2350738"/>
+            <a:ext cx="238708" cy="205783"/>
+          </a:xfrm>
+          <a:prstGeom prst="triangle">
+            <a:avLst/>
+          </a:prstGeom>
+        </p:spPr>
+        <p:style>
+          <a:lnRef idx="2">
+            <a:schemeClr val="dk1">
+              <a:shade val="50000"/>
+            </a:schemeClr>
+          </a:lnRef>
+          <a:fillRef idx="1">
+            <a:schemeClr val="dk1"/>
+          </a:fillRef>
+          <a:effectRef idx="0">
+            <a:schemeClr val="dk1"/>
+          </a:effectRef>
+          <a:fontRef idx="minor">
+            <a:schemeClr val="lt1"/>
+          </a:fontRef>
+        </p:style>
+        <p:txBody>
+          <a:bodyPr rtlCol="0" anchor="ctr"/>
+          <a:lstStyle/>
+          <a:p>
+            <a:pPr algn="ctr"/>
+            <a:endParaRPr lang="en-US"/>
+          </a:p>
+        </p:txBody>
+      </p:sp>
+      <p:sp>
+        <p:nvSpPr>
+          <p:cNvPr id="34" name="Arc 33">
+            <a:extLst>
+              <a:ext uri="{FF2B5EF4-FFF2-40B4-BE49-F238E27FC236}">
+                <a16:creationId xmlns:a16="http://schemas.microsoft.com/office/drawing/2014/main" id="{8E8C7655-5298-CF44-96E1-EE4378631060}"/>
+              </a:ext>
+            </a:extLst>
+          </p:cNvPr>
+          <p:cNvSpPr/>
+          <p:nvPr/>
+        </p:nvSpPr>
+        <p:spPr>
+          <a:xfrm>
+            <a:off x="5764763" y="3438471"/>
+            <a:ext cx="1558160" cy="432000"/>
+          </a:xfrm>
+          <a:prstGeom prst="arc">
+            <a:avLst/>
+          </a:prstGeom>
+          <a:ln w="19050"/>
+        </p:spPr>
+        <p:style>
+          <a:lnRef idx="1">
+            <a:schemeClr val="dk1"/>
+          </a:lnRef>
+          <a:fillRef idx="0">
+            <a:schemeClr val="dk1"/>
+          </a:fillRef>
+          <a:effectRef idx="0">
+            <a:schemeClr val="dk1"/>
+          </a:effectRef>
+          <a:fontRef idx="minor">
+            <a:schemeClr val="tx1"/>
+          </a:fontRef>
+        </p:style>
+        <p:txBody>
+          <a:bodyPr rtlCol="0" anchor="ctr"/>
+          <a:lstStyle/>
+          <a:p>
+            <a:pPr algn="ctr"/>
+            <a:endParaRPr lang="en-US"/>
+          </a:p>
+        </p:txBody>
+      </p:sp>
+      <p:sp>
+        <p:nvSpPr>
+          <p:cNvPr id="35" name="TextBox 34">
+            <a:extLst>
+              <a:ext uri="{FF2B5EF4-FFF2-40B4-BE49-F238E27FC236}">
+                <a16:creationId xmlns:a16="http://schemas.microsoft.com/office/drawing/2014/main" id="{8894A2E8-C63E-B84F-BEF5-0A53740AECE9}"/>
+              </a:ext>
+            </a:extLst>
+          </p:cNvPr>
+          <p:cNvSpPr txBox="1"/>
+          <p:nvPr/>
+        </p:nvSpPr>
+        <p:spPr>
+          <a:xfrm>
+            <a:off x="4360172" y="1261971"/>
+            <a:ext cx="372218" cy="276999"/>
+          </a:xfrm>
+          <a:prstGeom prst="rect">
+            <a:avLst/>
+          </a:prstGeom>
+          <a:noFill/>
+        </p:spPr>
+        <p:txBody>
+          <a:bodyPr wrap="none" rtlCol="0">
+            <a:spAutoFit/>
+          </a:bodyPr>
+          <a:lstStyle/>
+          <a:p>
+            <a:r>
+              <a:rPr lang="en-US" sz="1200" b="1" dirty="0">
+                <a:latin typeface="CMU Serif Roman" panose="02000603000000000000" pitchFamily="2" charset="0"/>
+                <a:ea typeface="CMU Serif Roman" panose="02000603000000000000" pitchFamily="2" charset="0"/>
+                <a:cs typeface="CMU Serif Roman" panose="02000603000000000000" pitchFamily="2" charset="0"/>
+              </a:rPr>
+              <a:t>C1</a:t>
+            </a:r>
+          </a:p>
+        </p:txBody>
+      </p:sp>
+      <p:sp>
+        <p:nvSpPr>
+          <p:cNvPr id="36" name="TextBox 35">
+            <a:extLst>
+              <a:ext uri="{FF2B5EF4-FFF2-40B4-BE49-F238E27FC236}">
+                <a16:creationId xmlns:a16="http://schemas.microsoft.com/office/drawing/2014/main" id="{CDFD2E90-407C-5E44-BB10-AFB70FACF5A6}"/>
+              </a:ext>
+            </a:extLst>
+          </p:cNvPr>
+          <p:cNvSpPr txBox="1"/>
+          <p:nvPr/>
+        </p:nvSpPr>
+        <p:spPr>
+          <a:xfrm>
+            <a:off x="4012982" y="2176631"/>
+            <a:ext cx="372218" cy="276999"/>
+          </a:xfrm>
+          <a:prstGeom prst="rect">
+            <a:avLst/>
+          </a:prstGeom>
+          <a:noFill/>
+        </p:spPr>
+        <p:txBody>
+          <a:bodyPr wrap="none" rtlCol="0">
+            <a:spAutoFit/>
+          </a:bodyPr>
+          <a:lstStyle/>
+          <a:p>
+            <a:r>
+              <a:rPr lang="en-US" sz="1200" b="1" dirty="0">
+                <a:latin typeface="CMU Serif Roman" panose="02000603000000000000" pitchFamily="2" charset="0"/>
+                <a:ea typeface="CMU Serif Roman" panose="02000603000000000000" pitchFamily="2" charset="0"/>
+                <a:cs typeface="CMU Serif Roman" panose="02000603000000000000" pitchFamily="2" charset="0"/>
+              </a:rPr>
+              <a:t>C1</a:t>
+            </a:r>
+          </a:p>
+        </p:txBody>
+      </p:sp>
+      <p:sp>
+        <p:nvSpPr>
+          <p:cNvPr id="37" name="TextBox 36">
+            <a:extLst>
+              <a:ext uri="{FF2B5EF4-FFF2-40B4-BE49-F238E27FC236}">
+                <a16:creationId xmlns:a16="http://schemas.microsoft.com/office/drawing/2014/main" id="{F86927AD-E463-5D4E-B385-095BE50C2A59}"/>
+              </a:ext>
+            </a:extLst>
+          </p:cNvPr>
+          <p:cNvSpPr txBox="1"/>
+          <p:nvPr/>
+        </p:nvSpPr>
+        <p:spPr>
+          <a:xfrm>
+            <a:off x="3997681" y="4442227"/>
+            <a:ext cx="372218" cy="276999"/>
+          </a:xfrm>
+          <a:prstGeom prst="rect">
+            <a:avLst/>
+          </a:prstGeom>
+          <a:noFill/>
+        </p:spPr>
+        <p:txBody>
+          <a:bodyPr wrap="none" rtlCol="0">
+            <a:spAutoFit/>
+          </a:bodyPr>
+          <a:lstStyle/>
+          <a:p>
+            <a:r>
+              <a:rPr lang="en-US" sz="1200" b="1" dirty="0">
+                <a:latin typeface="CMU Serif Roman" panose="02000603000000000000" pitchFamily="2" charset="0"/>
+                <a:ea typeface="CMU Serif Roman" panose="02000603000000000000" pitchFamily="2" charset="0"/>
+                <a:cs typeface="CMU Serif Roman" panose="02000603000000000000" pitchFamily="2" charset="0"/>
+              </a:rPr>
+              <a:t>C1</a:t>
+            </a:r>
+          </a:p>
+        </p:txBody>
+      </p:sp>
+    </p:spTree>
+    <p:extLst>
+      <p:ext uri="{BB962C8B-B14F-4D97-AF65-F5344CB8AC3E}">
+        <p14:creationId xmlns:p14="http://schemas.microsoft.com/office/powerpoint/2010/main" val="1530060336"/>
+      </p:ext>
+    </p:extLst>
+  </p:cSld>
+  <p:clrMapOvr>
+    <a:masterClrMapping/>
+  </p:clrMapOvr>
+</p:sld>
+</file>
+
 <file path=ppt/theme/theme1.xml><?xml version="1.0" encoding="utf-8"?>
 <a:theme xmlns:a="http://schemas.openxmlformats.org/drawingml/2006/main" name="Office Theme">
   <a:themeElements>

</xml_diff>

<commit_message>
Updated list of challenges.
</commit_message>
<xml_diff>
--- a/figs/discussion_points.pptx
+++ b/figs/discussion_points.pptx
@@ -4097,7 +4097,7 @@
                 <a:ea typeface="CMU Serif Roman" panose="02000603000000000000" pitchFamily="2" charset="0"/>
                 <a:cs typeface="CMU Serif Roman" panose="02000603000000000000" pitchFamily="2" charset="0"/>
               </a:rPr>
-              <a:t>C4</a:t>
+              <a:t>C5</a:t>
             </a:r>
             <a:r>
               <a:rPr lang="en-US" sz="1200" dirty="0">
@@ -4186,7 +4186,7 @@
                 <a:ea typeface="CMU Serif Roman" panose="02000603000000000000" pitchFamily="2" charset="0"/>
                 <a:cs typeface="CMU Serif Roman" panose="02000603000000000000" pitchFamily="2" charset="0"/>
               </a:rPr>
-              <a:t>C2-C4</a:t>
+              <a:t>C2-C5</a:t>
             </a:r>
             <a:r>
               <a:rPr lang="en-US" sz="1200" dirty="0">
@@ -4264,7 +4264,7 @@
                 <a:ea typeface="CMU Serif Roman" panose="02000603000000000000" pitchFamily="2" charset="0"/>
                 <a:cs typeface="CMU Serif Roman" panose="02000603000000000000" pitchFamily="2" charset="0"/>
               </a:rPr>
-              <a:t>C2,C4</a:t>
+              <a:t>C2,C4,C5</a:t>
             </a:r>
             <a:r>
               <a:rPr lang="en-US" sz="1200" dirty="0">
@@ -4292,7 +4292,7 @@
         <p:spPr>
           <a:xfrm>
             <a:off x="6814495" y="3648370"/>
-            <a:ext cx="959132" cy="316529"/>
+            <a:ext cx="959132" cy="432000"/>
           </a:xfrm>
           <a:prstGeom prst="roundRect">
             <a:avLst/>
@@ -4324,6 +4324,33 @@
                 <a:cs typeface="CMU Serif Roman" panose="02000603000000000000" pitchFamily="2" charset="0"/>
               </a:rPr>
               <a:t>Publish</a:t>
+            </a:r>
+          </a:p>
+          <a:p>
+            <a:pPr algn="ctr"/>
+            <a:r>
+              <a:rPr lang="en-US" sz="1200" dirty="0">
+                <a:latin typeface="CMU Serif Roman" panose="02000603000000000000" pitchFamily="2" charset="0"/>
+                <a:ea typeface="CMU Serif Roman" panose="02000603000000000000" pitchFamily="2" charset="0"/>
+                <a:cs typeface="CMU Serif Roman" panose="02000603000000000000" pitchFamily="2" charset="0"/>
+              </a:rPr>
+              <a:t>(</a:t>
+            </a:r>
+            <a:r>
+              <a:rPr lang="en-US" sz="1200" b="1" dirty="0">
+                <a:latin typeface="CMU Serif Roman" panose="02000603000000000000" pitchFamily="2" charset="0"/>
+                <a:ea typeface="CMU Serif Roman" panose="02000603000000000000" pitchFamily="2" charset="0"/>
+                <a:cs typeface="CMU Serif Roman" panose="02000603000000000000" pitchFamily="2" charset="0"/>
+              </a:rPr>
+              <a:t>C5</a:t>
+            </a:r>
+            <a:r>
+              <a:rPr lang="en-US" sz="1200" dirty="0">
+                <a:latin typeface="CMU Serif Roman" panose="02000603000000000000" pitchFamily="2" charset="0"/>
+                <a:ea typeface="CMU Serif Roman" panose="02000603000000000000" pitchFamily="2" charset="0"/>
+                <a:cs typeface="CMU Serif Roman" panose="02000603000000000000" pitchFamily="2" charset="0"/>
+              </a:rPr>
+              <a:t>)</a:t>
             </a:r>
           </a:p>
         </p:txBody>

</xml_diff>

<commit_message>
Fixed mistakes and started shortening the paper.
</commit_message>
<xml_diff>
--- a/figs/discussion_points.pptx
+++ b/figs/discussion_points.pptx
@@ -262,7 +262,7 @@
           <a:p>
             <a:fld id="{66BB895C-E5E2-8742-96B2-8A497FA5D297}" type="datetimeFigureOut">
               <a:rPr lang="en-US" smtClean="0"/>
-              <a:t>6/17/20</a:t>
+              <a:t>6/18/20</a:t>
             </a:fld>
             <a:endParaRPr lang="en-US"/>
           </a:p>
@@ -462,7 +462,7 @@
           <a:p>
             <a:fld id="{66BB895C-E5E2-8742-96B2-8A497FA5D297}" type="datetimeFigureOut">
               <a:rPr lang="en-US" smtClean="0"/>
-              <a:t>6/17/20</a:t>
+              <a:t>6/18/20</a:t>
             </a:fld>
             <a:endParaRPr lang="en-US"/>
           </a:p>
@@ -672,7 +672,7 @@
           <a:p>
             <a:fld id="{66BB895C-E5E2-8742-96B2-8A497FA5D297}" type="datetimeFigureOut">
               <a:rPr lang="en-US" smtClean="0"/>
-              <a:t>6/17/20</a:t>
+              <a:t>6/18/20</a:t>
             </a:fld>
             <a:endParaRPr lang="en-US"/>
           </a:p>
@@ -872,7 +872,7 @@
           <a:p>
             <a:fld id="{66BB895C-E5E2-8742-96B2-8A497FA5D297}" type="datetimeFigureOut">
               <a:rPr lang="en-US" smtClean="0"/>
-              <a:t>6/17/20</a:t>
+              <a:t>6/18/20</a:t>
             </a:fld>
             <a:endParaRPr lang="en-US"/>
           </a:p>
@@ -1148,7 +1148,7 @@
           <a:p>
             <a:fld id="{66BB895C-E5E2-8742-96B2-8A497FA5D297}" type="datetimeFigureOut">
               <a:rPr lang="en-US" smtClean="0"/>
-              <a:t>6/17/20</a:t>
+              <a:t>6/18/20</a:t>
             </a:fld>
             <a:endParaRPr lang="en-US"/>
           </a:p>
@@ -1416,7 +1416,7 @@
           <a:p>
             <a:fld id="{66BB895C-E5E2-8742-96B2-8A497FA5D297}" type="datetimeFigureOut">
               <a:rPr lang="en-US" smtClean="0"/>
-              <a:t>6/17/20</a:t>
+              <a:t>6/18/20</a:t>
             </a:fld>
             <a:endParaRPr lang="en-US"/>
           </a:p>
@@ -1831,7 +1831,7 @@
           <a:p>
             <a:fld id="{66BB895C-E5E2-8742-96B2-8A497FA5D297}" type="datetimeFigureOut">
               <a:rPr lang="en-US" smtClean="0"/>
-              <a:t>6/17/20</a:t>
+              <a:t>6/18/20</a:t>
             </a:fld>
             <a:endParaRPr lang="en-US"/>
           </a:p>
@@ -1973,7 +1973,7 @@
           <a:p>
             <a:fld id="{66BB895C-E5E2-8742-96B2-8A497FA5D297}" type="datetimeFigureOut">
               <a:rPr lang="en-US" smtClean="0"/>
-              <a:t>6/17/20</a:t>
+              <a:t>6/18/20</a:t>
             </a:fld>
             <a:endParaRPr lang="en-US"/>
           </a:p>
@@ -2086,7 +2086,7 @@
           <a:p>
             <a:fld id="{66BB895C-E5E2-8742-96B2-8A497FA5D297}" type="datetimeFigureOut">
               <a:rPr lang="en-US" smtClean="0"/>
-              <a:t>6/17/20</a:t>
+              <a:t>6/18/20</a:t>
             </a:fld>
             <a:endParaRPr lang="en-US"/>
           </a:p>
@@ -2399,7 +2399,7 @@
           <a:p>
             <a:fld id="{66BB895C-E5E2-8742-96B2-8A497FA5D297}" type="datetimeFigureOut">
               <a:rPr lang="en-US" smtClean="0"/>
-              <a:t>6/17/20</a:t>
+              <a:t>6/18/20</a:t>
             </a:fld>
             <a:endParaRPr lang="en-US"/>
           </a:p>
@@ -2688,7 +2688,7 @@
           <a:p>
             <a:fld id="{66BB895C-E5E2-8742-96B2-8A497FA5D297}" type="datetimeFigureOut">
               <a:rPr lang="en-US" smtClean="0"/>
-              <a:t>6/17/20</a:t>
+              <a:t>6/18/20</a:t>
             </a:fld>
             <a:endParaRPr lang="en-US"/>
           </a:p>
@@ -2931,7 +2931,7 @@
           <a:p>
             <a:fld id="{66BB895C-E5E2-8742-96B2-8A497FA5D297}" type="datetimeFigureOut">
               <a:rPr lang="en-US" smtClean="0"/>
-              <a:t>6/17/20</a:t>
+              <a:t>6/18/20</a:t>
             </a:fld>
             <a:endParaRPr lang="en-US"/>
           </a:p>
@@ -3363,7 +3363,7 @@
         <p:spPr>
           <a:xfrm>
             <a:off x="4602823" y="2262367"/>
-            <a:ext cx="2114626" cy="910129"/>
+            <a:ext cx="1639842" cy="632121"/>
           </a:xfrm>
           <a:prstGeom prst="ellipse">
             <a:avLst/>
@@ -3391,7 +3391,7 @@
           <a:p>
             <a:pPr algn="ctr"/>
             <a:r>
-              <a:rPr lang="en-US" b="1" dirty="0">
+              <a:rPr lang="en-US" sz="1400" b="1" dirty="0">
                 <a:latin typeface="CMU Serif Roman" panose="02000603000000000000" pitchFamily="2" charset="0"/>
                 <a:ea typeface="CMU Serif Roman" panose="02000603000000000000" pitchFamily="2" charset="0"/>
                 <a:cs typeface="CMU Serif Roman" panose="02000603000000000000" pitchFamily="2" charset="0"/>
@@ -3415,8 +3415,8 @@
         </p:nvSpPr>
         <p:spPr>
           <a:xfrm>
-            <a:off x="4869026" y="1558081"/>
-            <a:ext cx="1582220" cy="469524"/>
+            <a:off x="4809257" y="1864552"/>
+            <a:ext cx="1226974" cy="326103"/>
           </a:xfrm>
           <a:prstGeom prst="rect">
             <a:avLst/>
@@ -3442,7 +3442,7 @@
           <a:p>
             <a:pPr algn="ctr"/>
             <a:r>
-              <a:rPr lang="en-US" sz="1200" dirty="0">
+              <a:rPr lang="en-US" sz="1000" dirty="0">
                 <a:latin typeface="CMU Serif Roman" panose="02000603000000000000" pitchFamily="2" charset="0"/>
                 <a:ea typeface="CMU Serif Roman" panose="02000603000000000000" pitchFamily="2" charset="0"/>
                 <a:cs typeface="CMU Serif Roman" panose="02000603000000000000" pitchFamily="2" charset="0"/>
@@ -3466,8 +3466,8 @@
         </p:nvSpPr>
         <p:spPr>
           <a:xfrm>
-            <a:off x="2844091" y="2027605"/>
-            <a:ext cx="1582220" cy="469524"/>
+            <a:off x="3198654" y="2190656"/>
+            <a:ext cx="1226974" cy="326103"/>
           </a:xfrm>
           <a:prstGeom prst="rect">
             <a:avLst/>
@@ -3493,7 +3493,7 @@
           <a:p>
             <a:pPr algn="ctr"/>
             <a:r>
-              <a:rPr lang="en-US" sz="1200" dirty="0">
+              <a:rPr lang="en-US" sz="1000" dirty="0">
                 <a:latin typeface="CMU Serif Roman" panose="02000603000000000000" pitchFamily="2" charset="0"/>
                 <a:ea typeface="CMU Serif Roman" panose="02000603000000000000" pitchFamily="2" charset="0"/>
                 <a:cs typeface="CMU Serif Roman" panose="02000603000000000000" pitchFamily="2" charset="0"/>
@@ -3517,8 +3517,8 @@
         </p:nvSpPr>
         <p:spPr>
           <a:xfrm>
-            <a:off x="3020603" y="3155035"/>
-            <a:ext cx="1582220" cy="469524"/>
+            <a:off x="3375849" y="2731436"/>
+            <a:ext cx="1226974" cy="326103"/>
           </a:xfrm>
           <a:prstGeom prst="rect">
             <a:avLst/>
@@ -3544,7 +3544,7 @@
           <a:p>
             <a:pPr algn="ctr"/>
             <a:r>
-              <a:rPr lang="en-US" sz="1200" dirty="0">
+              <a:rPr lang="en-US" sz="1000" dirty="0">
                 <a:latin typeface="CMU Serif Roman" panose="02000603000000000000" pitchFamily="2" charset="0"/>
                 <a:ea typeface="CMU Serif Roman" panose="02000603000000000000" pitchFamily="2" charset="0"/>
                 <a:cs typeface="CMU Serif Roman" panose="02000603000000000000" pitchFamily="2" charset="0"/>
@@ -3568,8 +3568,8 @@
         </p:nvSpPr>
         <p:spPr>
           <a:xfrm>
-            <a:off x="6893961" y="2027605"/>
-            <a:ext cx="1582220" cy="469524"/>
+            <a:off x="6419860" y="2190655"/>
+            <a:ext cx="1226974" cy="326103"/>
           </a:xfrm>
           <a:prstGeom prst="rect">
             <a:avLst/>
@@ -3595,7 +3595,7 @@
           <a:p>
             <a:pPr algn="ctr"/>
             <a:r>
-              <a:rPr lang="en-US" sz="1200" dirty="0">
+              <a:rPr lang="en-US" sz="1000" dirty="0">
                 <a:latin typeface="CMU Serif Roman" panose="02000603000000000000" pitchFamily="2" charset="0"/>
                 <a:ea typeface="CMU Serif Roman" panose="02000603000000000000" pitchFamily="2" charset="0"/>
                 <a:cs typeface="CMU Serif Roman" panose="02000603000000000000" pitchFamily="2" charset="0"/>
@@ -3619,8 +3619,8 @@
         </p:nvSpPr>
         <p:spPr>
           <a:xfrm>
-            <a:off x="6626832" y="3172496"/>
-            <a:ext cx="1582220" cy="469524"/>
+            <a:off x="6242665" y="2731436"/>
+            <a:ext cx="1226974" cy="326103"/>
           </a:xfrm>
           <a:prstGeom prst="rect">
             <a:avLst/>
@@ -3646,7 +3646,7 @@
           <a:p>
             <a:pPr algn="ctr"/>
             <a:r>
-              <a:rPr lang="en-US" sz="1200" dirty="0">
+              <a:rPr lang="en-US" sz="1000" dirty="0">
                 <a:latin typeface="CMU Serif Roman" panose="02000603000000000000" pitchFamily="2" charset="0"/>
                 <a:ea typeface="CMU Serif Roman" panose="02000603000000000000" pitchFamily="2" charset="0"/>
                 <a:cs typeface="CMU Serif Roman" panose="02000603000000000000" pitchFamily="2" charset="0"/>

</xml_diff>